<commit_message>
Updated quiz for first lecture
</commit_message>
<xml_diff>
--- a/PHYS101/endocrine-control-systems/quiz.pptx
+++ b/PHYS101/endocrine-control-systems/quiz.pptx
@@ -6,15 +6,12 @@
   </p:sldMasterIdLst>
   <p:sldIdLst>
     <p:sldId id="256" r:id="rId2"/>
-    <p:sldId id="258" r:id="rId3"/>
-    <p:sldId id="260" r:id="rId4"/>
-    <p:sldId id="261" r:id="rId5"/>
-    <p:sldId id="262" r:id="rId6"/>
+    <p:sldId id="260" r:id="rId3"/>
   </p:sldIdLst>
   <p:sldSz cx="9144000" cy="6858000" type="screen4x3"/>
   <p:notesSz cx="6858000" cy="9144000"/>
   <p:custDataLst>
-    <p:tags r:id="rId8"/>
+    <p:tags r:id="rId5"/>
   </p:custDataLst>
   <p:defaultTextStyle>
     <a:defPPr>
@@ -295,7 +292,7 @@
           <a:p>
             <a:fld id="{B2EC1910-A3DA-D744-9F2D-023C0D62DF49}" type="datetimeFigureOut">
               <a:rPr lang="en-US" smtClean="0"/>
-              <a:t>3/22/15</a:t>
+              <a:t>3/18/16</a:t>
             </a:fld>
             <a:endParaRPr lang="en-US"/>
           </a:p>
@@ -465,7 +462,7 @@
           <a:p>
             <a:fld id="{B2EC1910-A3DA-D744-9F2D-023C0D62DF49}" type="datetimeFigureOut">
               <a:rPr lang="en-US" smtClean="0"/>
-              <a:t>3/22/15</a:t>
+              <a:t>3/18/16</a:t>
             </a:fld>
             <a:endParaRPr lang="en-US"/>
           </a:p>
@@ -645,7 +642,7 @@
           <a:p>
             <a:fld id="{B2EC1910-A3DA-D744-9F2D-023C0D62DF49}" type="datetimeFigureOut">
               <a:rPr lang="en-US" smtClean="0"/>
-              <a:t>3/22/15</a:t>
+              <a:t>3/18/16</a:t>
             </a:fld>
             <a:endParaRPr lang="en-US"/>
           </a:p>
@@ -815,7 +812,7 @@
           <a:p>
             <a:fld id="{B2EC1910-A3DA-D744-9F2D-023C0D62DF49}" type="datetimeFigureOut">
               <a:rPr lang="en-US" smtClean="0"/>
-              <a:t>3/22/15</a:t>
+              <a:t>3/18/16</a:t>
             </a:fld>
             <a:endParaRPr lang="en-US"/>
           </a:p>
@@ -1061,7 +1058,7 @@
           <a:p>
             <a:fld id="{B2EC1910-A3DA-D744-9F2D-023C0D62DF49}" type="datetimeFigureOut">
               <a:rPr lang="en-US" smtClean="0"/>
-              <a:t>3/22/15</a:t>
+              <a:t>3/18/16</a:t>
             </a:fld>
             <a:endParaRPr lang="en-US"/>
           </a:p>
@@ -1349,7 +1346,7 @@
           <a:p>
             <a:fld id="{B2EC1910-A3DA-D744-9F2D-023C0D62DF49}" type="datetimeFigureOut">
               <a:rPr lang="en-US" smtClean="0"/>
-              <a:t>3/22/15</a:t>
+              <a:t>3/18/16</a:t>
             </a:fld>
             <a:endParaRPr lang="en-US"/>
           </a:p>
@@ -1771,7 +1768,7 @@
           <a:p>
             <a:fld id="{B2EC1910-A3DA-D744-9F2D-023C0D62DF49}" type="datetimeFigureOut">
               <a:rPr lang="en-US" smtClean="0"/>
-              <a:t>3/22/15</a:t>
+              <a:t>3/18/16</a:t>
             </a:fld>
             <a:endParaRPr lang="en-US"/>
           </a:p>
@@ -1889,7 +1886,7 @@
           <a:p>
             <a:fld id="{B2EC1910-A3DA-D744-9F2D-023C0D62DF49}" type="datetimeFigureOut">
               <a:rPr lang="en-US" smtClean="0"/>
-              <a:t>3/22/15</a:t>
+              <a:t>3/18/16</a:t>
             </a:fld>
             <a:endParaRPr lang="en-US"/>
           </a:p>
@@ -1984,7 +1981,7 @@
           <a:p>
             <a:fld id="{B2EC1910-A3DA-D744-9F2D-023C0D62DF49}" type="datetimeFigureOut">
               <a:rPr lang="en-US" smtClean="0"/>
-              <a:t>3/22/15</a:t>
+              <a:t>3/18/16</a:t>
             </a:fld>
             <a:endParaRPr lang="en-US"/>
           </a:p>
@@ -2261,7 +2258,7 @@
           <a:p>
             <a:fld id="{B2EC1910-A3DA-D744-9F2D-023C0D62DF49}" type="datetimeFigureOut">
               <a:rPr lang="en-US" smtClean="0"/>
-              <a:t>3/22/15</a:t>
+              <a:t>3/18/16</a:t>
             </a:fld>
             <a:endParaRPr lang="en-US"/>
           </a:p>
@@ -2514,7 +2511,7 @@
           <a:p>
             <a:fld id="{B2EC1910-A3DA-D744-9F2D-023C0D62DF49}" type="datetimeFigureOut">
               <a:rPr lang="en-US" smtClean="0"/>
-              <a:t>3/22/15</a:t>
+              <a:t>3/18/16</a:t>
             </a:fld>
             <a:endParaRPr lang="en-US"/>
           </a:p>
@@ -2727,7 +2724,7 @@
           <a:p>
             <a:fld id="{B2EC1910-A3DA-D744-9F2D-023C0D62DF49}" type="datetimeFigureOut">
               <a:rPr lang="en-US" smtClean="0"/>
-              <a:t>3/22/15</a:t>
+              <a:t>3/18/16</a:t>
             </a:fld>
             <a:endParaRPr lang="en-US"/>
           </a:p>
@@ -3197,312 +3194,6 @@
                 <a:latin typeface="Calibri" charset="0"/>
                 <a:ea typeface="MS PGothic" charset="0"/>
               </a:rPr>
-              <a:t>The Hypothalamus Connects to the Anterior Pituitary via the…</a:t>
-            </a:r>
-            <a:endParaRPr lang="en-US" dirty="0">
-              <a:latin typeface="Calibri" charset="0"/>
-              <a:ea typeface="MS PGothic" charset="0"/>
-            </a:endParaRPr>
-          </a:p>
-        </p:txBody>
-      </p:sp>
-      <p:sp>
-        <p:nvSpPr>
-          <p:cNvPr id="2051" name="TPAnswers"/>
-          <p:cNvSpPr>
-            <a:spLocks noGrp="1"/>
-          </p:cNvSpPr>
-          <p:nvPr>
-            <p:ph idx="1"/>
-            <p:custDataLst>
-              <p:tags r:id="rId2"/>
-            </p:custDataLst>
-          </p:nvPr>
-        </p:nvSpPr>
-        <p:spPr>
-          <a:xfrm>
-            <a:off x="457200" y="1600200"/>
-            <a:ext cx="4114800" cy="4525963"/>
-          </a:xfrm>
-        </p:spPr>
-        <p:txBody>
-          <a:bodyPr/>
-          <a:lstStyle/>
-          <a:p>
-            <a:pPr marL="514350" indent="-514350" eaLnBrk="1" hangingPunct="1">
-              <a:buFont typeface="Arial" charset="0"/>
-              <a:buAutoNum type="alphaUcPeriod"/>
-            </a:pPr>
-            <a:r>
-              <a:rPr lang="en-US" dirty="0" smtClean="0">
-                <a:latin typeface="Calibri" charset="0"/>
-                <a:ea typeface="MS PGothic" charset="0"/>
-              </a:rPr>
-              <a:t>Infundibulum</a:t>
-            </a:r>
-          </a:p>
-          <a:p>
-            <a:pPr marL="514350" indent="-514350" eaLnBrk="1" hangingPunct="1">
-              <a:buFont typeface="Arial" charset="0"/>
-              <a:buAutoNum type="alphaUcPeriod"/>
-            </a:pPr>
-            <a:r>
-              <a:rPr lang="en-US" dirty="0" smtClean="0">
-                <a:latin typeface="Calibri" charset="0"/>
-                <a:ea typeface="MS PGothic" charset="0"/>
-              </a:rPr>
-              <a:t>Synaptic Connections</a:t>
-            </a:r>
-          </a:p>
-          <a:p>
-            <a:pPr marL="514350" indent="-514350">
-              <a:buFont typeface="Arial" charset="0"/>
-              <a:buAutoNum type="alphaUcPeriod"/>
-            </a:pPr>
-            <a:r>
-              <a:rPr lang="en-US" dirty="0" err="1" smtClean="0">
-                <a:latin typeface="Calibri" charset="0"/>
-                <a:ea typeface="MS PGothic" charset="0"/>
-              </a:rPr>
-              <a:t>Hypophysial</a:t>
-            </a:r>
-            <a:r>
-              <a:rPr lang="en-US" dirty="0" smtClean="0">
-                <a:latin typeface="Calibri" charset="0"/>
-                <a:ea typeface="MS PGothic" charset="0"/>
-              </a:rPr>
-              <a:t> portal system</a:t>
-            </a:r>
-            <a:endParaRPr lang="en-US" dirty="0" smtClean="0">
-              <a:latin typeface="Calibri" charset="0"/>
-              <a:ea typeface="MS PGothic" charset="0"/>
-            </a:endParaRPr>
-          </a:p>
-          <a:p>
-            <a:pPr marL="514350" indent="-514350" eaLnBrk="1" hangingPunct="1">
-              <a:buFont typeface="Arial" charset="0"/>
-              <a:buAutoNum type="alphaUcPeriod"/>
-            </a:pPr>
-            <a:r>
-              <a:rPr lang="en-US" dirty="0" smtClean="0">
-                <a:latin typeface="Calibri" charset="0"/>
-                <a:ea typeface="MS PGothic" charset="0"/>
-              </a:rPr>
-              <a:t>Carotid sinus</a:t>
-            </a:r>
-            <a:endParaRPr lang="en-US" dirty="0">
-              <a:latin typeface="Calibri" charset="0"/>
-              <a:ea typeface="MS PGothic" charset="0"/>
-            </a:endParaRPr>
-          </a:p>
-        </p:txBody>
-      </p:sp>
-      <p:pic>
-        <p:nvPicPr>
-          <p:cNvPr id="6" name="TPChart" descr="E7E9931B74FC424A978563AB8FEC56B7Chart20150322122753608.png"/>
-          <p:cNvPicPr>
-            <a:picLocks/>
-          </p:cNvPicPr>
-          <p:nvPr>
-            <p:custDataLst>
-              <p:tags r:id="rId3"/>
-            </p:custDataLst>
-          </p:nvPr>
-        </p:nvPicPr>
-        <p:blipFill>
-          <a:blip r:embed="rId6">
-            <a:extLst>
-              <a:ext uri="{28A0092B-C50C-407E-A947-70E740481C1C}">
-                <a14:useLocalDpi xmlns:a14="http://schemas.microsoft.com/office/drawing/2010/main" val="0"/>
-              </a:ext>
-            </a:extLst>
-          </a:blip>
-          <a:stretch>
-            <a:fillRect/>
-          </a:stretch>
-        </p:blipFill>
-        <p:spPr>
-          <a:xfrm>
-            <a:off x="4508500" y="1600200"/>
-            <a:ext cx="4572000" cy="5143500"/>
-          </a:xfrm>
-          <a:prstGeom prst="rect">
-            <a:avLst/>
-          </a:prstGeom>
-        </p:spPr>
-      </p:pic>
-      <p:grpSp>
-        <p:nvGrpSpPr>
-          <p:cNvPr id="5" name="TPCountdown"/>
-          <p:cNvGrpSpPr/>
-          <p:nvPr>
-            <p:custDataLst>
-              <p:tags r:id="rId4"/>
-            </p:custDataLst>
-          </p:nvPr>
-        </p:nvGrpSpPr>
-        <p:grpSpPr>
-          <a:xfrm>
-            <a:off x="8382000" y="6096000"/>
-            <a:ext cx="635000" cy="635000"/>
-            <a:chOff x="8318500" y="6032500"/>
-            <a:chExt cx="635000" cy="635000"/>
-          </a:xfrm>
-        </p:grpSpPr>
-        <p:sp>
-          <p:nvSpPr>
-            <p:cNvPr id="4" name="CountdownShape"/>
-            <p:cNvSpPr/>
-            <p:nvPr/>
-          </p:nvSpPr>
-          <p:spPr>
-            <a:xfrm>
-              <a:off x="8318500" y="6032500"/>
-              <a:ext cx="635000" cy="635000"/>
-            </a:xfrm>
-            <a:prstGeom prst="bevel">
-              <a:avLst/>
-            </a:prstGeom>
-            <a:effectLst/>
-            <a:extLst>
-              <a:ext uri="{AF507438-7753-43e0-B8FC-AC1667EBCBE1}">
-                <a14:hiddenEffects xmlns:a14="http://schemas.microsoft.com/office/drawing/2010/main">
-                  <a:effectLst>
-                    <a:outerShdw blurRad="40000" dist="23000" dir="5400000" rotWithShape="0">
-                      <a:srgbClr val="000000">
-                        <a:alpha val="35000"/>
-                      </a:srgbClr>
-                    </a:outerShdw>
-                  </a:effectLst>
-                </a14:hiddenEffects>
-              </a:ext>
-            </a:extLst>
-          </p:spPr>
-          <p:style>
-            <a:lnRef idx="1">
-              <a:schemeClr val="accent1"/>
-            </a:lnRef>
-            <a:fillRef idx="3">
-              <a:schemeClr val="accent1"/>
-            </a:fillRef>
-            <a:effectRef idx="2">
-              <a:schemeClr val="accent1"/>
-            </a:effectRef>
-            <a:fontRef idx="minor">
-              <a:schemeClr val="lt1"/>
-            </a:fontRef>
-          </p:style>
-          <p:txBody>
-            <a:bodyPr rtlCol="0" anchor="ctr"/>
-            <a:lstStyle/>
-            <a:p>
-              <a:pPr algn="ctr"/>
-              <a:endParaRPr lang="en-US"/>
-            </a:p>
-          </p:txBody>
-        </p:sp>
-        <p:sp>
-          <p:nvSpPr>
-            <p:cNvPr id="3" name="CountdownText"/>
-            <p:cNvSpPr txBox="1"/>
-            <p:nvPr/>
-          </p:nvSpPr>
-          <p:spPr>
-            <a:xfrm>
-              <a:off x="8318500" y="6032500"/>
-              <a:ext cx="635000" cy="635000"/>
-            </a:xfrm>
-            <a:prstGeom prst="rect">
-              <a:avLst/>
-            </a:prstGeom>
-            <a:noFill/>
-            <a:effectLst/>
-            <a:extLst>
-              <a:ext uri="{AF507438-7753-43e0-B8FC-AC1667EBCBE1}">
-                <a14:hiddenEffects xmlns:a14="http://schemas.microsoft.com/office/drawing/2010/main">
-                  <a:effectLst/>
-                </a14:hiddenEffects>
-              </a:ext>
-            </a:extLst>
-          </p:spPr>
-          <p:txBody>
-            <a:bodyPr vert="horz" rtlCol="0" anchor="ctr" anchorCtr="1">
-              <a:noAutofit/>
-            </a:bodyPr>
-            <a:lstStyle/>
-            <a:p>
-              <a:pPr algn="r"/>
-              <a:r>
-                <a:rPr lang="en-US" sz="2400" b="1" smtClean="0">
-                  <a:latin typeface="Tahoma"/>
-                </a:rPr>
-                <a:t>30</a:t>
-              </a:r>
-              <a:endParaRPr lang="en-US" sz="2400" b="1">
-                <a:latin typeface="Tahoma"/>
-              </a:endParaRPr>
-            </a:p>
-          </p:txBody>
-        </p:sp>
-      </p:grpSp>
-    </p:spTree>
-    <p:custDataLst>
-      <p:tags r:id="rId1"/>
-    </p:custDataLst>
-  </p:cSld>
-  <p:clrMapOvr>
-    <a:masterClrMapping/>
-  </p:clrMapOvr>
-  <p:timing>
-    <p:tnLst>
-      <p:par>
-        <p:cTn xmlns:p14="http://schemas.microsoft.com/office/powerpoint/2010/main" id="1" dur="indefinite" restart="never" nodeType="tmRoot"/>
-      </p:par>
-    </p:tnLst>
-  </p:timing>
-</p:sld>
-</file>
-
-<file path=ppt/slides/slide3.xml><?xml version="1.0" encoding="utf-8"?>
-<p:sld xmlns:a="http://schemas.openxmlformats.org/drawingml/2006/main" xmlns:r="http://schemas.openxmlformats.org/officeDocument/2006/relationships" xmlns:p="http://schemas.openxmlformats.org/presentationml/2006/main">
-  <p:cSld>
-    <p:spTree>
-      <p:nvGrpSpPr>
-        <p:cNvPr id="1" name=""/>
-        <p:cNvGrpSpPr/>
-        <p:nvPr/>
-      </p:nvGrpSpPr>
-      <p:grpSpPr>
-        <a:xfrm>
-          <a:off x="0" y="0"/>
-          <a:ext cx="0" cy="0"/>
-          <a:chOff x="0" y="0"/>
-          <a:chExt cx="0" cy="0"/>
-        </a:xfrm>
-      </p:grpSpPr>
-      <p:sp>
-        <p:nvSpPr>
-          <p:cNvPr id="2050" name="TPQuestion"/>
-          <p:cNvSpPr>
-            <a:spLocks noGrp="1"/>
-          </p:cNvSpPr>
-          <p:nvPr>
-            <p:ph type="title"/>
-          </p:nvPr>
-        </p:nvSpPr>
-        <p:spPr/>
-        <p:txBody>
-          <a:bodyPr>
-            <a:normAutofit fontScale="90000"/>
-          </a:bodyPr>
-          <a:lstStyle/>
-          <a:p>
-            <a:pPr eaLnBrk="1" hangingPunct="1"/>
-            <a:r>
-              <a:rPr lang="en-US" dirty="0" smtClean="0">
-                <a:latin typeface="Calibri" charset="0"/>
-                <a:ea typeface="MS PGothic" charset="0"/>
-              </a:rPr>
               <a:t>Which of the following is a peptide hormones</a:t>
             </a:r>
             <a:endParaRPr lang="en-US" dirty="0">
@@ -3758,608 +3449,6 @@
 </p:sld>
 </file>
 
-<file path=ppt/slides/slide4.xml><?xml version="1.0" encoding="utf-8"?>
-<p:sld xmlns:a="http://schemas.openxmlformats.org/drawingml/2006/main" xmlns:r="http://schemas.openxmlformats.org/officeDocument/2006/relationships" xmlns:p="http://schemas.openxmlformats.org/presentationml/2006/main">
-  <p:cSld>
-    <p:spTree>
-      <p:nvGrpSpPr>
-        <p:cNvPr id="1" name=""/>
-        <p:cNvGrpSpPr/>
-        <p:nvPr/>
-      </p:nvGrpSpPr>
-      <p:grpSpPr>
-        <a:xfrm>
-          <a:off x="0" y="0"/>
-          <a:ext cx="0" cy="0"/>
-          <a:chOff x="0" y="0"/>
-          <a:chExt cx="0" cy="0"/>
-        </a:xfrm>
-      </p:grpSpPr>
-      <p:sp>
-        <p:nvSpPr>
-          <p:cNvPr id="2050" name="TPQuestion"/>
-          <p:cNvSpPr>
-            <a:spLocks noGrp="1"/>
-          </p:cNvSpPr>
-          <p:nvPr>
-            <p:ph type="title"/>
-          </p:nvPr>
-        </p:nvSpPr>
-        <p:spPr/>
-        <p:txBody>
-          <a:bodyPr>
-            <a:normAutofit fontScale="90000"/>
-          </a:bodyPr>
-          <a:lstStyle/>
-          <a:p>
-            <a:pPr eaLnBrk="1" hangingPunct="1"/>
-            <a:r>
-              <a:rPr lang="en-US" dirty="0" smtClean="0">
-                <a:latin typeface="Calibri" charset="0"/>
-                <a:ea typeface="MS PGothic" charset="0"/>
-              </a:rPr>
-              <a:t>What Cell Type Secretes Growth Hormone</a:t>
-            </a:r>
-            <a:endParaRPr lang="en-US" dirty="0">
-              <a:latin typeface="Calibri" charset="0"/>
-              <a:ea typeface="MS PGothic" charset="0"/>
-            </a:endParaRPr>
-          </a:p>
-        </p:txBody>
-      </p:sp>
-      <p:sp>
-        <p:nvSpPr>
-          <p:cNvPr id="2051" name="TPAnswers"/>
-          <p:cNvSpPr>
-            <a:spLocks noGrp="1"/>
-          </p:cNvSpPr>
-          <p:nvPr>
-            <p:ph idx="1"/>
-            <p:custDataLst>
-              <p:tags r:id="rId2"/>
-            </p:custDataLst>
-          </p:nvPr>
-        </p:nvSpPr>
-        <p:spPr>
-          <a:xfrm>
-            <a:off x="457200" y="1600200"/>
-            <a:ext cx="4114800" cy="4525963"/>
-          </a:xfrm>
-        </p:spPr>
-        <p:txBody>
-          <a:bodyPr/>
-          <a:lstStyle/>
-          <a:p>
-            <a:pPr marL="514350" indent="-514350" eaLnBrk="1" hangingPunct="1">
-              <a:buFont typeface="Arial" charset="0"/>
-              <a:buAutoNum type="alphaUcPeriod"/>
-            </a:pPr>
-            <a:r>
-              <a:rPr lang="en-US" dirty="0" err="1" smtClean="0">
-                <a:latin typeface="Calibri" charset="0"/>
-                <a:ea typeface="MS PGothic" charset="0"/>
-              </a:rPr>
-              <a:t>Lactotropes</a:t>
-            </a:r>
-            <a:endParaRPr lang="en-US" dirty="0" smtClean="0">
-              <a:latin typeface="Calibri" charset="0"/>
-              <a:ea typeface="MS PGothic" charset="0"/>
-            </a:endParaRPr>
-          </a:p>
-          <a:p>
-            <a:pPr marL="514350" indent="-514350" eaLnBrk="1" hangingPunct="1">
-              <a:buFont typeface="Arial" charset="0"/>
-              <a:buAutoNum type="alphaUcPeriod"/>
-            </a:pPr>
-            <a:r>
-              <a:rPr lang="en-US" dirty="0" err="1" smtClean="0">
-                <a:latin typeface="Calibri" charset="0"/>
-                <a:ea typeface="MS PGothic" charset="0"/>
-              </a:rPr>
-              <a:t>Thyrotropes</a:t>
-            </a:r>
-            <a:endParaRPr lang="en-US" dirty="0" smtClean="0">
-              <a:latin typeface="Calibri" charset="0"/>
-              <a:ea typeface="MS PGothic" charset="0"/>
-            </a:endParaRPr>
-          </a:p>
-          <a:p>
-            <a:pPr marL="514350" indent="-514350" eaLnBrk="1" hangingPunct="1">
-              <a:buFont typeface="Arial" charset="0"/>
-              <a:buAutoNum type="alphaUcPeriod"/>
-            </a:pPr>
-            <a:r>
-              <a:rPr lang="en-US" dirty="0" err="1" smtClean="0">
-                <a:latin typeface="Calibri" charset="0"/>
-                <a:ea typeface="MS PGothic" charset="0"/>
-              </a:rPr>
-              <a:t>Somatotropes</a:t>
-            </a:r>
-            <a:endParaRPr lang="en-US" dirty="0" smtClean="0">
-              <a:latin typeface="Calibri" charset="0"/>
-              <a:ea typeface="MS PGothic" charset="0"/>
-            </a:endParaRPr>
-          </a:p>
-          <a:p>
-            <a:pPr marL="514350" indent="-514350" eaLnBrk="1" hangingPunct="1">
-              <a:buFont typeface="Arial" charset="0"/>
-              <a:buAutoNum type="alphaUcPeriod"/>
-            </a:pPr>
-            <a:r>
-              <a:rPr lang="en-US" dirty="0" err="1" smtClean="0">
-                <a:latin typeface="Calibri" charset="0"/>
-                <a:ea typeface="MS PGothic" charset="0"/>
-              </a:rPr>
-              <a:t>Corticotropes</a:t>
-            </a:r>
-            <a:endParaRPr lang="en-US" dirty="0">
-              <a:latin typeface="Calibri" charset="0"/>
-              <a:ea typeface="MS PGothic" charset="0"/>
-            </a:endParaRPr>
-          </a:p>
-        </p:txBody>
-      </p:sp>
-      <p:pic>
-        <p:nvPicPr>
-          <p:cNvPr id="6" name="TPChart" descr="DB2C0C2B793C4DE2BB810E55656B9FEDChart20150322122753611.png"/>
-          <p:cNvPicPr>
-            <a:picLocks/>
-          </p:cNvPicPr>
-          <p:nvPr>
-            <p:custDataLst>
-              <p:tags r:id="rId3"/>
-            </p:custDataLst>
-          </p:nvPr>
-        </p:nvPicPr>
-        <p:blipFill>
-          <a:blip r:embed="rId6">
-            <a:extLst>
-              <a:ext uri="{28A0092B-C50C-407E-A947-70E740481C1C}">
-                <a14:useLocalDpi xmlns:a14="http://schemas.microsoft.com/office/drawing/2010/main" val="0"/>
-              </a:ext>
-            </a:extLst>
-          </a:blip>
-          <a:stretch>
-            <a:fillRect/>
-          </a:stretch>
-        </p:blipFill>
-        <p:spPr>
-          <a:xfrm>
-            <a:off x="4508500" y="1600200"/>
-            <a:ext cx="4572000" cy="5143500"/>
-          </a:xfrm>
-          <a:prstGeom prst="rect">
-            <a:avLst/>
-          </a:prstGeom>
-        </p:spPr>
-      </p:pic>
-      <p:grpSp>
-        <p:nvGrpSpPr>
-          <p:cNvPr id="5" name="TPCountdown"/>
-          <p:cNvGrpSpPr/>
-          <p:nvPr>
-            <p:custDataLst>
-              <p:tags r:id="rId4"/>
-            </p:custDataLst>
-          </p:nvPr>
-        </p:nvGrpSpPr>
-        <p:grpSpPr>
-          <a:xfrm>
-            <a:off x="8382000" y="6096000"/>
-            <a:ext cx="635000" cy="635000"/>
-            <a:chOff x="8318500" y="6032500"/>
-            <a:chExt cx="635000" cy="635000"/>
-          </a:xfrm>
-        </p:grpSpPr>
-        <p:sp>
-          <p:nvSpPr>
-            <p:cNvPr id="4" name="CountdownShape"/>
-            <p:cNvSpPr/>
-            <p:nvPr/>
-          </p:nvSpPr>
-          <p:spPr>
-            <a:xfrm>
-              <a:off x="8318500" y="6032500"/>
-              <a:ext cx="635000" cy="635000"/>
-            </a:xfrm>
-            <a:prstGeom prst="bevel">
-              <a:avLst/>
-            </a:prstGeom>
-            <a:effectLst/>
-            <a:extLst>
-              <a:ext uri="{AF507438-7753-43e0-B8FC-AC1667EBCBE1}">
-                <a14:hiddenEffects xmlns:a14="http://schemas.microsoft.com/office/drawing/2010/main">
-                  <a:effectLst>
-                    <a:outerShdw blurRad="40000" dist="23000" dir="5400000" rotWithShape="0">
-                      <a:srgbClr val="000000">
-                        <a:alpha val="35000"/>
-                      </a:srgbClr>
-                    </a:outerShdw>
-                  </a:effectLst>
-                </a14:hiddenEffects>
-              </a:ext>
-            </a:extLst>
-          </p:spPr>
-          <p:style>
-            <a:lnRef idx="1">
-              <a:schemeClr val="accent1"/>
-            </a:lnRef>
-            <a:fillRef idx="3">
-              <a:schemeClr val="accent1"/>
-            </a:fillRef>
-            <a:effectRef idx="2">
-              <a:schemeClr val="accent1"/>
-            </a:effectRef>
-            <a:fontRef idx="minor">
-              <a:schemeClr val="lt1"/>
-            </a:fontRef>
-          </p:style>
-          <p:txBody>
-            <a:bodyPr rtlCol="0" anchor="ctr"/>
-            <a:lstStyle/>
-            <a:p>
-              <a:pPr algn="ctr"/>
-              <a:endParaRPr lang="en-US"/>
-            </a:p>
-          </p:txBody>
-        </p:sp>
-        <p:sp>
-          <p:nvSpPr>
-            <p:cNvPr id="3" name="CountdownText"/>
-            <p:cNvSpPr txBox="1"/>
-            <p:nvPr/>
-          </p:nvSpPr>
-          <p:spPr>
-            <a:xfrm>
-              <a:off x="8318500" y="6032500"/>
-              <a:ext cx="635000" cy="635000"/>
-            </a:xfrm>
-            <a:prstGeom prst="rect">
-              <a:avLst/>
-            </a:prstGeom>
-            <a:noFill/>
-            <a:effectLst/>
-            <a:extLst>
-              <a:ext uri="{AF507438-7753-43e0-B8FC-AC1667EBCBE1}">
-                <a14:hiddenEffects xmlns:a14="http://schemas.microsoft.com/office/drawing/2010/main">
-                  <a:effectLst/>
-                </a14:hiddenEffects>
-              </a:ext>
-            </a:extLst>
-          </p:spPr>
-          <p:txBody>
-            <a:bodyPr vert="horz" rtlCol="0" anchor="ctr" anchorCtr="1">
-              <a:noAutofit/>
-            </a:bodyPr>
-            <a:lstStyle/>
-            <a:p>
-              <a:pPr algn="r"/>
-              <a:r>
-                <a:rPr lang="en-US" sz="2400" b="1" smtClean="0">
-                  <a:latin typeface="Tahoma"/>
-                </a:rPr>
-                <a:t>30</a:t>
-              </a:r>
-              <a:endParaRPr lang="en-US" sz="2400" b="1">
-                <a:latin typeface="Tahoma"/>
-              </a:endParaRPr>
-            </a:p>
-          </p:txBody>
-        </p:sp>
-      </p:grpSp>
-    </p:spTree>
-    <p:custDataLst>
-      <p:tags r:id="rId1"/>
-    </p:custDataLst>
-  </p:cSld>
-  <p:clrMapOvr>
-    <a:masterClrMapping/>
-  </p:clrMapOvr>
-  <p:timing>
-    <p:tnLst>
-      <p:par>
-        <p:cTn xmlns:p14="http://schemas.microsoft.com/office/powerpoint/2010/main" id="1" dur="indefinite" restart="never" nodeType="tmRoot"/>
-      </p:par>
-    </p:tnLst>
-  </p:timing>
-</p:sld>
-</file>
-
-<file path=ppt/slides/slide5.xml><?xml version="1.0" encoding="utf-8"?>
-<p:sld xmlns:a="http://schemas.openxmlformats.org/drawingml/2006/main" xmlns:r="http://schemas.openxmlformats.org/officeDocument/2006/relationships" xmlns:p="http://schemas.openxmlformats.org/presentationml/2006/main">
-  <p:cSld>
-    <p:spTree>
-      <p:nvGrpSpPr>
-        <p:cNvPr id="1" name=""/>
-        <p:cNvGrpSpPr/>
-        <p:nvPr/>
-      </p:nvGrpSpPr>
-      <p:grpSpPr>
-        <a:xfrm>
-          <a:off x="0" y="0"/>
-          <a:ext cx="0" cy="0"/>
-          <a:chOff x="0" y="0"/>
-          <a:chExt cx="0" cy="0"/>
-        </a:xfrm>
-      </p:grpSpPr>
-      <p:sp>
-        <p:nvSpPr>
-          <p:cNvPr id="2050" name="TPQuestion"/>
-          <p:cNvSpPr>
-            <a:spLocks noGrp="1"/>
-          </p:cNvSpPr>
-          <p:nvPr>
-            <p:ph type="title"/>
-          </p:nvPr>
-        </p:nvSpPr>
-        <p:spPr/>
-        <p:txBody>
-          <a:bodyPr/>
-          <a:lstStyle/>
-          <a:p>
-            <a:pPr eaLnBrk="1" hangingPunct="1"/>
-            <a:r>
-              <a:rPr lang="en-US" dirty="0" smtClean="0">
-                <a:latin typeface="Calibri" charset="0"/>
-                <a:ea typeface="MS PGothic" charset="0"/>
-              </a:rPr>
-              <a:t>Drinking a lot of water will…</a:t>
-            </a:r>
-            <a:endParaRPr lang="en-US" dirty="0">
-              <a:latin typeface="Calibri" charset="0"/>
-              <a:ea typeface="MS PGothic" charset="0"/>
-            </a:endParaRPr>
-          </a:p>
-        </p:txBody>
-      </p:sp>
-      <p:sp>
-        <p:nvSpPr>
-          <p:cNvPr id="2051" name="TPAnswers"/>
-          <p:cNvSpPr>
-            <a:spLocks noGrp="1"/>
-          </p:cNvSpPr>
-          <p:nvPr>
-            <p:ph idx="1"/>
-            <p:custDataLst>
-              <p:tags r:id="rId2"/>
-            </p:custDataLst>
-          </p:nvPr>
-        </p:nvSpPr>
-        <p:spPr>
-          <a:xfrm>
-            <a:off x="457200" y="1600200"/>
-            <a:ext cx="4114800" cy="4525963"/>
-          </a:xfrm>
-        </p:spPr>
-        <p:txBody>
-          <a:bodyPr>
-            <a:normAutofit fontScale="85000" lnSpcReduction="20000"/>
-          </a:bodyPr>
-          <a:lstStyle/>
-          <a:p>
-            <a:pPr marL="514350" indent="-514350" eaLnBrk="1" hangingPunct="1">
-              <a:buFont typeface="Arial" charset="0"/>
-              <a:buAutoNum type="alphaUcPeriod"/>
-            </a:pPr>
-            <a:r>
-              <a:rPr lang="en-US" dirty="0" smtClean="0">
-                <a:latin typeface="Calibri" charset="0"/>
-                <a:ea typeface="MS PGothic" charset="0"/>
-              </a:rPr>
-              <a:t>Increase vasopressin levels, causing water reuptake</a:t>
-            </a:r>
-          </a:p>
-          <a:p>
-            <a:pPr marL="514350" indent="-514350" eaLnBrk="1" hangingPunct="1">
-              <a:buFont typeface="Arial" charset="0"/>
-              <a:buAutoNum type="alphaUcPeriod"/>
-            </a:pPr>
-            <a:r>
-              <a:rPr lang="en-US" dirty="0" smtClean="0">
-                <a:latin typeface="Calibri" charset="0"/>
-                <a:ea typeface="MS PGothic" charset="0"/>
-              </a:rPr>
-              <a:t>Increase vasopressin levels, causing water excretion</a:t>
-            </a:r>
-          </a:p>
-          <a:p>
-            <a:pPr marL="514350" indent="-514350" eaLnBrk="1" hangingPunct="1">
-              <a:buFont typeface="Arial" charset="0"/>
-              <a:buAutoNum type="alphaUcPeriod"/>
-            </a:pPr>
-            <a:r>
-              <a:rPr lang="en-US" dirty="0" smtClean="0">
-                <a:latin typeface="Calibri" charset="0"/>
-                <a:ea typeface="MS PGothic" charset="0"/>
-              </a:rPr>
-              <a:t>Decrease vasopressin levels, causing water reuptake</a:t>
-            </a:r>
-          </a:p>
-          <a:p>
-            <a:pPr marL="514350" indent="-514350" eaLnBrk="1" hangingPunct="1">
-              <a:buFont typeface="Arial" charset="0"/>
-              <a:buAutoNum type="alphaUcPeriod"/>
-            </a:pPr>
-            <a:r>
-              <a:rPr lang="en-US" dirty="0" smtClean="0">
-                <a:latin typeface="Calibri" charset="0"/>
-                <a:ea typeface="MS PGothic" charset="0"/>
-              </a:rPr>
-              <a:t>Decrease vasopressin levels, causing water excretion</a:t>
-            </a:r>
-            <a:endParaRPr lang="en-US" dirty="0">
-              <a:latin typeface="Calibri" charset="0"/>
-              <a:ea typeface="MS PGothic" charset="0"/>
-            </a:endParaRPr>
-          </a:p>
-        </p:txBody>
-      </p:sp>
-      <p:pic>
-        <p:nvPicPr>
-          <p:cNvPr id="7" name="TPChart" descr="B6DB3BCC0ADB44A0B08D98541CCAC0C9Chart20150322122753611.png"/>
-          <p:cNvPicPr>
-            <a:picLocks/>
-          </p:cNvPicPr>
-          <p:nvPr>
-            <p:custDataLst>
-              <p:tags r:id="rId3"/>
-            </p:custDataLst>
-          </p:nvPr>
-        </p:nvPicPr>
-        <p:blipFill>
-          <a:blip r:embed="rId6">
-            <a:extLst>
-              <a:ext uri="{28A0092B-C50C-407E-A947-70E740481C1C}">
-                <a14:useLocalDpi xmlns:a14="http://schemas.microsoft.com/office/drawing/2010/main" val="0"/>
-              </a:ext>
-            </a:extLst>
-          </a:blip>
-          <a:stretch>
-            <a:fillRect/>
-          </a:stretch>
-        </p:blipFill>
-        <p:spPr>
-          <a:xfrm>
-            <a:off x="4508500" y="1600200"/>
-            <a:ext cx="4572000" cy="5143500"/>
-          </a:xfrm>
-          <a:prstGeom prst="rect">
-            <a:avLst/>
-          </a:prstGeom>
-        </p:spPr>
-      </p:pic>
-      <p:grpSp>
-        <p:nvGrpSpPr>
-          <p:cNvPr id="5" name="TPCountdown"/>
-          <p:cNvGrpSpPr/>
-          <p:nvPr>
-            <p:custDataLst>
-              <p:tags r:id="rId4"/>
-            </p:custDataLst>
-          </p:nvPr>
-        </p:nvGrpSpPr>
-        <p:grpSpPr>
-          <a:xfrm>
-            <a:off x="8382000" y="6096000"/>
-            <a:ext cx="635000" cy="635000"/>
-            <a:chOff x="8318500" y="6032500"/>
-            <a:chExt cx="635000" cy="635000"/>
-          </a:xfrm>
-        </p:grpSpPr>
-        <p:sp>
-          <p:nvSpPr>
-            <p:cNvPr id="4" name="CountdownShape"/>
-            <p:cNvSpPr/>
-            <p:nvPr/>
-          </p:nvSpPr>
-          <p:spPr>
-            <a:xfrm>
-              <a:off x="8318500" y="6032500"/>
-              <a:ext cx="635000" cy="635000"/>
-            </a:xfrm>
-            <a:prstGeom prst="bevel">
-              <a:avLst/>
-            </a:prstGeom>
-            <a:effectLst/>
-            <a:extLst>
-              <a:ext uri="{AF507438-7753-43e0-B8FC-AC1667EBCBE1}">
-                <a14:hiddenEffects xmlns:a14="http://schemas.microsoft.com/office/drawing/2010/main">
-                  <a:effectLst>
-                    <a:outerShdw blurRad="40000" dist="23000" dir="5400000" rotWithShape="0">
-                      <a:srgbClr val="000000">
-                        <a:alpha val="35000"/>
-                      </a:srgbClr>
-                    </a:outerShdw>
-                  </a:effectLst>
-                </a14:hiddenEffects>
-              </a:ext>
-            </a:extLst>
-          </p:spPr>
-          <p:style>
-            <a:lnRef idx="1">
-              <a:schemeClr val="accent1"/>
-            </a:lnRef>
-            <a:fillRef idx="3">
-              <a:schemeClr val="accent1"/>
-            </a:fillRef>
-            <a:effectRef idx="2">
-              <a:schemeClr val="accent1"/>
-            </a:effectRef>
-            <a:fontRef idx="minor">
-              <a:schemeClr val="lt1"/>
-            </a:fontRef>
-          </p:style>
-          <p:txBody>
-            <a:bodyPr rtlCol="0" anchor="ctr"/>
-            <a:lstStyle/>
-            <a:p>
-              <a:pPr algn="ctr"/>
-              <a:endParaRPr lang="en-US"/>
-            </a:p>
-          </p:txBody>
-        </p:sp>
-        <p:sp>
-          <p:nvSpPr>
-            <p:cNvPr id="3" name="CountdownText"/>
-            <p:cNvSpPr txBox="1"/>
-            <p:nvPr/>
-          </p:nvSpPr>
-          <p:spPr>
-            <a:xfrm>
-              <a:off x="8318500" y="6032500"/>
-              <a:ext cx="635000" cy="635000"/>
-            </a:xfrm>
-            <a:prstGeom prst="rect">
-              <a:avLst/>
-            </a:prstGeom>
-            <a:noFill/>
-            <a:effectLst/>
-            <a:extLst>
-              <a:ext uri="{AF507438-7753-43e0-B8FC-AC1667EBCBE1}">
-                <a14:hiddenEffects xmlns:a14="http://schemas.microsoft.com/office/drawing/2010/main">
-                  <a:effectLst/>
-                </a14:hiddenEffects>
-              </a:ext>
-            </a:extLst>
-          </p:spPr>
-          <p:txBody>
-            <a:bodyPr vert="horz" rtlCol="0" anchor="ctr" anchorCtr="1">
-              <a:noAutofit/>
-            </a:bodyPr>
-            <a:lstStyle/>
-            <a:p>
-              <a:pPr algn="r"/>
-              <a:r>
-                <a:rPr lang="en-US" sz="2400" b="1" smtClean="0">
-                  <a:latin typeface="Tahoma"/>
-                </a:rPr>
-                <a:t>30</a:t>
-              </a:r>
-              <a:endParaRPr lang="en-US" sz="2400" b="1">
-                <a:latin typeface="Tahoma"/>
-              </a:endParaRPr>
-            </a:p>
-          </p:txBody>
-        </p:sp>
-      </p:grpSp>
-    </p:spTree>
-    <p:custDataLst>
-      <p:tags r:id="rId1"/>
-    </p:custDataLst>
-  </p:cSld>
-  <p:clrMapOvr>
-    <a:masterClrMapping/>
-  </p:clrMapOvr>
-  <p:timing>
-    <p:tnLst>
-      <p:par>
-        <p:cTn xmlns:p14="http://schemas.microsoft.com/office/powerpoint/2010/main" id="1" dur="indefinite" restart="never" nodeType="tmRoot"/>
-      </p:par>
-    </p:tnLst>
-  </p:timing>
-</p:sld>
-</file>
-
 <file path=ppt/tags/tag1.xml><?xml version="1.0" encoding="utf-8"?>
 <p:tagLst xmlns:a="http://schemas.openxmlformats.org/drawingml/2006/main" xmlns:r="http://schemas.openxmlformats.org/officeDocument/2006/relationships" xmlns:p="http://schemas.openxmlformats.org/presentationml/2006/main">
   <p:tag name="TPVERSION" val="5"/>
@@ -4369,85 +3458,13 @@
 </p:tagLst>
 </file>
 
-<file path=ppt/tags/tag10.xml><?xml version="1.0" encoding="utf-8"?>
+<file path=ppt/tags/tag2.xml><?xml version="1.0" encoding="utf-8"?>
 <p:tagLst xmlns:a="http://schemas.openxmlformats.org/drawingml/2006/main" xmlns:r="http://schemas.openxmlformats.org/officeDocument/2006/relationships" xmlns:p="http://schemas.openxmlformats.org/presentationml/2006/main">
-  <p:tag name="SLIDEGUID" val="DB2C0C2B793C4DE2BB810E55656B9FED"/>
+  <p:tag name="SLIDEGUID" val="245110FE48154FD499B0D033FAC67418"/>
   <p:tag name="AUTOOPENPOLL" val="False"/>
   <p:tag name="TYPE" val="MultiChoiceSlide"/>
   <p:tag name="TPSLIDEBULLETSTYLE" val="2"/>
-  <p:tag name="TPQUESTIONXML" val="&lt;?xml version=&quot;1.0&quot; encoding=&quot;UTF-8&quot; standalone=&quot;yes&quot;?&gt;&lt;questionlist&gt;&lt;properties&gt;&lt;guid&gt;E5B33A8E084F417E9E7790E3615332A6&lt;/guid&gt;&lt;date&gt;3/22/2015 12:27:53 PM&lt;/date&gt;&lt;/properties&gt;&lt;questionlisttemplate&gt;&lt;correctvalue&gt;1&lt;/correctvalue&gt;&lt;incorrectvalue&gt;0&lt;/incorrectvalue&gt;&lt;numberofquestions&gt;1&lt;/numberofquestions&gt;&lt;questiontype&gt;1&lt;/questiontype&gt;&lt;numberofchoices&gt;4&lt;/numberofchoices&gt;&lt;bulletstyle&gt;2&lt;/bulletstyle&gt;&lt;questionfont&gt;Verdana&lt;/questionfont&gt;&lt;questionfontsize&gt;12&lt;/questionfontsize&gt;&lt;answerfont&gt;Verdana&lt;/answerfont&gt;&lt;answerfontsize&gt;12&lt;/answerfontsize&gt;&lt;showresults&gt;True&lt;/showresults&gt;&lt;countdowntime&gt;30&lt;/countdowntime&gt;&lt;responsegrid&gt;0&lt;/responsegrid&gt;&lt;/questionlisttemplate&gt;&lt;questions&gt;&lt;multichoice&gt;&lt;guid&gt;DB2C0C2B793C4DE2BB810E55656B9FED&lt;/guid&gt;&lt;repollguid&gt;C7A6171EDC084DBD8B712CCDF5535C4C&lt;/repollguid&gt;&lt;sourceid&gt;3EBFF4DC262B4A8FA50A8692AD3AFA48&lt;/sourceid&gt;&lt;questiontext&gt;What Cell Type Secretes Growth Hormone&lt;/questiontext&gt;&lt;showresults&gt;True&lt;/showresults&gt;&lt;responsegrid&gt;0&lt;/responsegrid&gt;&lt;countdowntimer&gt;True&lt;/countdowntimer&gt;&lt;countdowntime&gt;30&lt;/countdowntime&gt;&lt;correctvalue&gt;1&lt;/correctvalue&gt;&lt;incorrectvalue&gt;0&lt;/incorrectvalue&gt;&lt;responselimit&gt;1&lt;/responselimit&gt;&lt;bulletstyle&gt;2&lt;/bulletstyle&gt;&lt;answers&gt;&lt;answer&gt;&lt;guid&gt;E83344E4DE30438CBF7DBA59E6082B30&lt;/guid&gt;&lt;answertext&gt;Lactotropes&lt;/answertext&gt;&lt;valuetype&gt;-1&lt;/valuetype&gt;&lt;/answer&gt;&lt;answer&gt;&lt;guid&gt;865AB46204994759B1227BC9497BA3F9&lt;/guid&gt;&lt;answertext&gt;Thyrotropes&lt;/answertext&gt;&lt;valuetype&gt;-1&lt;/valuetype&gt;&lt;/answer&gt;&lt;answer&gt;&lt;guid&gt;682F34B7003A432A8AC7D4EE9F2EFEB5&lt;/guid&gt;&lt;answertext&gt;Somatotropes&lt;/answertext&gt;&lt;valuetype&gt;1&lt;/valuetype&gt;&lt;/answer&gt;&lt;answer&gt;&lt;guid&gt;4EF9EADFFBFC407DA9C11D47F784F130&lt;/guid&gt;&lt;answertext&gt;Corticotropes&lt;/answertext&gt;&lt;valuetype&gt;-1&lt;/valuetype&gt;&lt;/answer&gt;&lt;/answers&gt;&lt;/multichoice&gt;&lt;/questions&gt;&lt;/questionlist&gt;"/>
-  <p:tag name="LIVECHARTING" val="False"/>
-  <p:tag name="CHARTTYPE" val="0"/>
-  <p:tag name="CHARTDEFINEDCOLORS" val="3,6,10,45,32,50,13,4,9,55,1"/>
-</p:tagLst>
-</file>
-
-<file path=ppt/tags/tag11.xml><?xml version="1.0" encoding="utf-8"?>
-<p:tagLst xmlns:a="http://schemas.openxmlformats.org/drawingml/2006/main" xmlns:r="http://schemas.openxmlformats.org/officeDocument/2006/relationships" xmlns:p="http://schemas.openxmlformats.org/presentationml/2006/main">
-  <p:tag name="ZEROBASED" val="False"/>
-</p:tagLst>
-</file>
-
-<file path=ppt/tags/tag12.xml><?xml version="1.0" encoding="utf-8"?>
-<p:tagLst xmlns:a="http://schemas.openxmlformats.org/drawingml/2006/main" xmlns:r="http://schemas.openxmlformats.org/officeDocument/2006/relationships" xmlns:p="http://schemas.openxmlformats.org/presentationml/2006/main">
-  <p:tag name="TYPE" val="0"/>
-  <p:tag name="DEFINEDCOLORS" val="3,6,10,45,32,50,13,4,9,55,1"/>
-  <p:tag name="COLORTYPE" val="SCHEME"/>
-  <p:tag name="NUMBERFORMAT" val="0"/>
-  <p:tag name="LABELFORMAT" val="0"/>
-</p:tagLst>
-</file>
-
-<file path=ppt/tags/tag13.xml><?xml version="1.0" encoding="utf-8"?>
-<p:tagLst xmlns:a="http://schemas.openxmlformats.org/drawingml/2006/main" xmlns:r="http://schemas.openxmlformats.org/officeDocument/2006/relationships" xmlns:p="http://schemas.openxmlformats.org/presentationml/2006/main">
-  <p:tag name="TPCOUNTDOWNSECONDS" val="30"/>
-  <p:tag name="TYPE" val="0"/>
-</p:tagLst>
-</file>
-
-<file path=ppt/tags/tag14.xml><?xml version="1.0" encoding="utf-8"?>
-<p:tagLst xmlns:a="http://schemas.openxmlformats.org/drawingml/2006/main" xmlns:r="http://schemas.openxmlformats.org/officeDocument/2006/relationships" xmlns:p="http://schemas.openxmlformats.org/presentationml/2006/main">
-  <p:tag name="SLIDEGUID" val="B6DB3BCC0ADB44A0B08D98541CCAC0C9"/>
-  <p:tag name="AUTOOPENPOLL" val="False"/>
-  <p:tag name="TYPE" val="MultiChoiceSlide"/>
-  <p:tag name="TPSLIDEBULLETSTYLE" val="2"/>
-  <p:tag name="TPQUESTIONXML" val="&lt;?xml version=&quot;1.0&quot; encoding=&quot;UTF-8&quot; standalone=&quot;yes&quot;?&gt;&lt;questionlist&gt;&lt;properties&gt;&lt;guid&gt;5D2FA86D03714C38B038627D646402FE&lt;/guid&gt;&lt;date&gt;3/22/2015 12:27:53 PM&lt;/date&gt;&lt;/properties&gt;&lt;questionlisttemplate&gt;&lt;correctvalue&gt;1&lt;/correctvalue&gt;&lt;incorrectvalue&gt;0&lt;/incorrectvalue&gt;&lt;numberofquestions&gt;1&lt;/numberofquestions&gt;&lt;questiontype&gt;1&lt;/questiontype&gt;&lt;numberofchoices&gt;4&lt;/numberofchoices&gt;&lt;bulletstyle&gt;2&lt;/bulletstyle&gt;&lt;questionfont&gt;Verdana&lt;/questionfont&gt;&lt;questionfontsize&gt;12&lt;/questionfontsize&gt;&lt;answerfont&gt;Verdana&lt;/answerfont&gt;&lt;answerfontsize&gt;12&lt;/answerfontsize&gt;&lt;showresults&gt;True&lt;/showresults&gt;&lt;countdowntime&gt;30&lt;/countdowntime&gt;&lt;responsegrid&gt;0&lt;/responsegrid&gt;&lt;/questionlisttemplate&gt;&lt;questions&gt;&lt;multichoice&gt;&lt;guid&gt;B6DB3BCC0ADB44A0B08D98541CCAC0C9&lt;/guid&gt;&lt;repollguid&gt;D8CFAED5557C4DE78EBCA863E903D7AF&lt;/repollguid&gt;&lt;sourceid&gt;28DC5B020712413BBFDE1DE128BB04C9&lt;/sourceid&gt;&lt;questiontext&gt;Drinking a lot of water will…&lt;/questiontext&gt;&lt;showresults&gt;True&lt;/showresults&gt;&lt;responsegrid&gt;0&lt;/responsegrid&gt;&lt;countdowntimer&gt;True&lt;/countdowntimer&gt;&lt;countdowntime&gt;30&lt;/countdowntime&gt;&lt;correctvalue&gt;1&lt;/correctvalue&gt;&lt;incorrectvalue&gt;0&lt;/incorrectvalue&gt;&lt;responselimit&gt;1&lt;/responselimit&gt;&lt;bulletstyle&gt;2&lt;/bulletstyle&gt;&lt;answers&gt;&lt;answer&gt;&lt;guid&gt;1E7AD7BF52614E339C1F34AB3C9DA90F&lt;/guid&gt;&lt;answertext&gt;Increase vasopressin levels, causing water reuptake&lt;/answertext&gt;&lt;valuetype&gt;1&lt;/valuetype&gt;&lt;/answer&gt;&lt;answer&gt;&lt;guid&gt;5FD20636A7074F0FA3762E3DFF6329C5&lt;/guid&gt;&lt;answertext&gt;Increase vasopressin levels, causing water excretion&lt;/answertext&gt;&lt;valuetype&gt;-1&lt;/valuetype&gt;&lt;/answer&gt;&lt;answer&gt;&lt;guid&gt;4CAA05F4F7F44406A7B26A8A5E795C01&lt;/guid&gt;&lt;answertext&gt;Decrease vasopressin levels, causing water reuptake&lt;/answertext&gt;&lt;valuetype&gt;-1&lt;/valuetype&gt;&lt;/answer&gt;&lt;answer&gt;&lt;guid&gt;26353927FBF84E50BA59D26B8A43FDB7&lt;/guid&gt;&lt;answertext&gt;Decrease vasopressin levels, causing water excretion&lt;/answertext&gt;&lt;valuetype&gt;-1&lt;/valuetype&gt;&lt;/answer&gt;&lt;/answers&gt;&lt;/multichoice&gt;&lt;/questions&gt;&lt;/questionlist&gt;"/>
-  <p:tag name="LIVECHARTING" val="False"/>
-  <p:tag name="CHARTTYPE" val="0"/>
-  <p:tag name="CHARTDEFINEDCOLORS" val="3,6,10,45,32,50,13,4,9,55,1"/>
-</p:tagLst>
-</file>
-
-<file path=ppt/tags/tag15.xml><?xml version="1.0" encoding="utf-8"?>
-<p:tagLst xmlns:a="http://schemas.openxmlformats.org/drawingml/2006/main" xmlns:r="http://schemas.openxmlformats.org/officeDocument/2006/relationships" xmlns:p="http://schemas.openxmlformats.org/presentationml/2006/main">
-  <p:tag name="ZEROBASED" val="False"/>
-</p:tagLst>
-</file>
-
-<file path=ppt/tags/tag16.xml><?xml version="1.0" encoding="utf-8"?>
-<p:tagLst xmlns:a="http://schemas.openxmlformats.org/drawingml/2006/main" xmlns:r="http://schemas.openxmlformats.org/officeDocument/2006/relationships" xmlns:p="http://schemas.openxmlformats.org/presentationml/2006/main">
-  <p:tag name="TYPE" val="0"/>
-  <p:tag name="DEFINEDCOLORS" val="3,6,10,45,32,50,13,4,9,55,1"/>
-  <p:tag name="COLORTYPE" val="SCHEME"/>
-  <p:tag name="NUMBERFORMAT" val="0"/>
-  <p:tag name="LABELFORMAT" val="0"/>
-</p:tagLst>
-</file>
-
-<file path=ppt/tags/tag17.xml><?xml version="1.0" encoding="utf-8"?>
-<p:tagLst xmlns:a="http://schemas.openxmlformats.org/drawingml/2006/main" xmlns:r="http://schemas.openxmlformats.org/officeDocument/2006/relationships" xmlns:p="http://schemas.openxmlformats.org/presentationml/2006/main">
-  <p:tag name="TPCOUNTDOWNSECONDS" val="30"/>
-  <p:tag name="TYPE" val="0"/>
-</p:tagLst>
-</file>
-
-<file path=ppt/tags/tag2.xml><?xml version="1.0" encoding="utf-8"?>
-<p:tagLst xmlns:a="http://schemas.openxmlformats.org/drawingml/2006/main" xmlns:r="http://schemas.openxmlformats.org/officeDocument/2006/relationships" xmlns:p="http://schemas.openxmlformats.org/presentationml/2006/main">
-  <p:tag name="SLIDEGUID" val="E7E9931B74FC424A978563AB8FEC56B7"/>
-  <p:tag name="AUTOOPENPOLL" val="False"/>
-  <p:tag name="TYPE" val="MultiChoiceSlide"/>
-  <p:tag name="TPSLIDEBULLETSTYLE" val="2"/>
-  <p:tag name="TPQUESTIONXML" val="&lt;?xml version=&quot;1.0&quot; encoding=&quot;UTF-8&quot; standalone=&quot;yes&quot;?&gt;&lt;questionlist&gt;&lt;properties&gt;&lt;guid&gt;A1B66D4739AD4B1A8AD08C16FA878ADA&lt;/guid&gt;&lt;date&gt;3/22/2015 12:27:53 PM&lt;/date&gt;&lt;/properties&gt;&lt;questionlisttemplate&gt;&lt;correctvalue&gt;1&lt;/correctvalue&gt;&lt;incorrectvalue&gt;0&lt;/incorrectvalue&gt;&lt;numberofquestions&gt;1&lt;/numberofquestions&gt;&lt;questiontype&gt;1&lt;/questiontype&gt;&lt;numberofchoices&gt;4&lt;/numberofchoices&gt;&lt;bulletstyle&gt;2&lt;/bulletstyle&gt;&lt;questionfont&gt;Verdana&lt;/questionfont&gt;&lt;questionfontsize&gt;12&lt;/questionfontsize&gt;&lt;answerfont&gt;Verdana&lt;/answerfont&gt;&lt;answerfontsize&gt;12&lt;/answerfontsize&gt;&lt;showresults&gt;True&lt;/showresults&gt;&lt;countdowntime&gt;30&lt;/countdowntime&gt;&lt;responsegrid&gt;0&lt;/responsegrid&gt;&lt;/questionlisttemplate&gt;&lt;questions&gt;&lt;multichoice&gt;&lt;guid&gt;E7E9931B74FC424A978563AB8FEC56B7&lt;/guid&gt;&lt;repollguid&gt;512CA7956FBF4AB7AAB4D021EF0BC9AE&lt;/repollguid&gt;&lt;sourceid&gt;E9A7D663502A463FAEB9B9035F3FB886&lt;/sourceid&gt;&lt;questiontext&gt;The Hypothalamus Connects to the Anterior Pituitary via the…&lt;/questiontext&gt;&lt;showresults&gt;True&lt;/showresults&gt;&lt;responsegrid&gt;0&lt;/responsegrid&gt;&lt;countdowntimer&gt;True&lt;/countdowntimer&gt;&lt;countdowntime&gt;30&lt;/countdowntime&gt;&lt;correctvalue&gt;1&lt;/correctvalue&gt;&lt;incorrectvalue&gt;0&lt;/incorrectvalue&gt;&lt;responselimit&gt;1&lt;/responselimit&gt;&lt;bulletstyle&gt;2&lt;/bulletstyle&gt;&lt;answers&gt;&lt;answer&gt;&lt;guid&gt;37BA07A59F644B41B3EBD0A6C66D879D&lt;/guid&gt;&lt;answertext&gt;Infundibulum&lt;/answertext&gt;&lt;valuetype&gt;-1&lt;/valuetype&gt;&lt;/answer&gt;&lt;answer&gt;&lt;guid&gt;AE48874E7FB44E0EA86AE9A576D5D799&lt;/guid&gt;&lt;answertext&gt;Synaptic Connections&lt;/answertext&gt;&lt;valuetype&gt;-1&lt;/valuetype&gt;&lt;/answer&gt;&lt;answer&gt;&lt;guid&gt;B75F3648AA434906AF89B49DCD089F65&lt;/guid&gt;&lt;answertext&gt;Hypophysial portal system&lt;/answertext&gt;&lt;valuetype&gt;1&lt;/valuetype&gt;&lt;/answer&gt;&lt;answer&gt;&lt;guid&gt;77F9A4545898466EBBA50E4B870CFB29&lt;/guid&gt;&lt;answertext&gt;Carotid sinus&lt;/answertext&gt;&lt;valuetype&gt;-1&lt;/valuetype&gt;&lt;/answer&gt;&lt;/answers&gt;&lt;/multichoice&gt;&lt;/questions&gt;&lt;/questionlist&gt;"/>
+  <p:tag name="TPQUESTIONXML" val="&lt;?xml version=&quot;1.0&quot; encoding=&quot;UTF-8&quot; standalone=&quot;yes&quot;?&gt;&lt;questionlist&gt;&lt;properties&gt;&lt;guid&gt;4DB40A4FF4A54E5DB592AA96522F5E43&lt;/guid&gt;&lt;date&gt;3/22/2015 12:27:53 PM&lt;/date&gt;&lt;/properties&gt;&lt;questionlisttemplate&gt;&lt;correctvalue&gt;1&lt;/correctvalue&gt;&lt;incorrectvalue&gt;0&lt;/incorrectvalue&gt;&lt;numberofquestions&gt;1&lt;/numberofquestions&gt;&lt;questiontype&gt;1&lt;/questiontype&gt;&lt;numberofchoices&gt;4&lt;/numberofchoices&gt;&lt;bulletstyle&gt;2&lt;/bulletstyle&gt;&lt;questionfont&gt;Verdana&lt;/questionfont&gt;&lt;questionfontsize&gt;12&lt;/questionfontsize&gt;&lt;answerfont&gt;Verdana&lt;/answerfont&gt;&lt;answerfontsize&gt;12&lt;/answerfontsize&gt;&lt;showresults&gt;True&lt;/showresults&gt;&lt;countdowntime&gt;30&lt;/countdowntime&gt;&lt;responsegrid&gt;0&lt;/responsegrid&gt;&lt;/questionlisttemplate&gt;&lt;questions&gt;&lt;multichoice&gt;&lt;guid&gt;245110FE48154FD499B0D033FAC67418&lt;/guid&gt;&lt;repollguid&gt;6B672B89E7CA47C8A21EE73A3D571E1F&lt;/repollguid&gt;&lt;sourceid&gt;22EFE440585F4829B00268F9BF5338C8&lt;/sourceid&gt;&lt;questiontext&gt;Which of the following is a peptide hormones&lt;/questiontext&gt;&lt;showresults&gt;True&lt;/showresults&gt;&lt;responsegrid&gt;0&lt;/responsegrid&gt;&lt;countdowntimer&gt;True&lt;/countdowntimer&gt;&lt;countdowntime&gt;30&lt;/countdowntime&gt;&lt;correctvalue&gt;1&lt;/correctvalue&gt;&lt;incorrectvalue&gt;0&lt;/incorrectvalue&gt;&lt;responselimit&gt;1&lt;/responselimit&gt;&lt;bulletstyle&gt;2&lt;/bulletstyle&gt;&lt;correctanswerindicator&gt;True&lt;/correctanswerindicator&gt;&lt;answers&gt;&lt;answer&gt;&lt;guid&gt;348002FD717D4D4AB58E3BB828550C93&lt;/guid&gt;&lt;answertext&gt;Growth Hormone&lt;/answertext&gt;&lt;valuetype&gt;-1&lt;/valuetype&gt;&lt;/answer&gt;&lt;answer&gt;&lt;guid&gt;A7E9091B6F5D49E7A9E55489FCC29130&lt;/guid&gt;&lt;answertext&gt;Vasopressin&lt;/answertext&gt;&lt;valuetype&gt;1&lt;/valuetype&gt;&lt;/answer&gt;&lt;answer&gt;&lt;guid&gt;2DA176845E3F408785B21B779CC87632&lt;/guid&gt;&lt;answertext&gt;Testosterone&lt;/answertext&gt;&lt;valuetype&gt;-1&lt;/valuetype&gt;&lt;/answer&gt;&lt;answer&gt;&lt;guid&gt;97D6A21FE6CD4387BF7EE28CA17C7EF7&lt;/guid&gt;&lt;answertext&gt;Epinephrine&lt;/answertext&gt;&lt;valuetype&gt;-1&lt;/valuetype&gt;&lt;/answer&gt;&lt;/answers&gt;&lt;/multichoice&gt;&lt;/questions&gt;&lt;/questionlist&gt;"/>
   <p:tag name="LIVECHARTING" val="False"/>
   <p:tag name="CHARTTYPE" val="0"/>
   <p:tag name="CHARTDEFINEDCOLORS" val="3,6,10,45,32,50,13,4,9,55,1"/>
@@ -4471,42 +3488,6 @@
 </file>
 
 <file path=ppt/tags/tag5.xml><?xml version="1.0" encoding="utf-8"?>
-<p:tagLst xmlns:a="http://schemas.openxmlformats.org/drawingml/2006/main" xmlns:r="http://schemas.openxmlformats.org/officeDocument/2006/relationships" xmlns:p="http://schemas.openxmlformats.org/presentationml/2006/main">
-  <p:tag name="TPCOUNTDOWNSECONDS" val="30"/>
-  <p:tag name="TYPE" val="0"/>
-</p:tagLst>
-</file>
-
-<file path=ppt/tags/tag6.xml><?xml version="1.0" encoding="utf-8"?>
-<p:tagLst xmlns:a="http://schemas.openxmlformats.org/drawingml/2006/main" xmlns:r="http://schemas.openxmlformats.org/officeDocument/2006/relationships" xmlns:p="http://schemas.openxmlformats.org/presentationml/2006/main">
-  <p:tag name="SLIDEGUID" val="245110FE48154FD499B0D033FAC67418"/>
-  <p:tag name="AUTOOPENPOLL" val="False"/>
-  <p:tag name="TYPE" val="MultiChoiceSlide"/>
-  <p:tag name="TPSLIDEBULLETSTYLE" val="2"/>
-  <p:tag name="TPQUESTIONXML" val="&lt;?xml version=&quot;1.0&quot; encoding=&quot;UTF-8&quot; standalone=&quot;yes&quot;?&gt;&lt;questionlist&gt;&lt;properties&gt;&lt;guid&gt;4DB40A4FF4A54E5DB592AA96522F5E43&lt;/guid&gt;&lt;date&gt;3/22/2015 12:27:53 PM&lt;/date&gt;&lt;/properties&gt;&lt;questionlisttemplate&gt;&lt;correctvalue&gt;1&lt;/correctvalue&gt;&lt;incorrectvalue&gt;0&lt;/incorrectvalue&gt;&lt;numberofquestions&gt;1&lt;/numberofquestions&gt;&lt;questiontype&gt;1&lt;/questiontype&gt;&lt;numberofchoices&gt;4&lt;/numberofchoices&gt;&lt;bulletstyle&gt;2&lt;/bulletstyle&gt;&lt;questionfont&gt;Verdana&lt;/questionfont&gt;&lt;questionfontsize&gt;12&lt;/questionfontsize&gt;&lt;answerfont&gt;Verdana&lt;/answerfont&gt;&lt;answerfontsize&gt;12&lt;/answerfontsize&gt;&lt;showresults&gt;True&lt;/showresults&gt;&lt;countdowntime&gt;30&lt;/countdowntime&gt;&lt;responsegrid&gt;0&lt;/responsegrid&gt;&lt;/questionlisttemplate&gt;&lt;questions&gt;&lt;multichoice&gt;&lt;guid&gt;245110FE48154FD499B0D033FAC67418&lt;/guid&gt;&lt;repollguid&gt;6B672B89E7CA47C8A21EE73A3D571E1F&lt;/repollguid&gt;&lt;sourceid&gt;22EFE440585F4829B00268F9BF5338C8&lt;/sourceid&gt;&lt;questiontext&gt;Which of the following is a peptide hormones&lt;/questiontext&gt;&lt;showresults&gt;True&lt;/showresults&gt;&lt;responsegrid&gt;0&lt;/responsegrid&gt;&lt;countdowntimer&gt;True&lt;/countdowntimer&gt;&lt;countdowntime&gt;30&lt;/countdowntime&gt;&lt;correctvalue&gt;1&lt;/correctvalue&gt;&lt;incorrectvalue&gt;0&lt;/incorrectvalue&gt;&lt;responselimit&gt;1&lt;/responselimit&gt;&lt;bulletstyle&gt;2&lt;/bulletstyle&gt;&lt;correctanswerindicator&gt;True&lt;/correctanswerindicator&gt;&lt;answers&gt;&lt;answer&gt;&lt;guid&gt;348002FD717D4D4AB58E3BB828550C93&lt;/guid&gt;&lt;answertext&gt;Growth Hormone&lt;/answertext&gt;&lt;valuetype&gt;-1&lt;/valuetype&gt;&lt;/answer&gt;&lt;answer&gt;&lt;guid&gt;A7E9091B6F5D49E7A9E55489FCC29130&lt;/guid&gt;&lt;answertext&gt;Vasopressin&lt;/answertext&gt;&lt;valuetype&gt;1&lt;/valuetype&gt;&lt;/answer&gt;&lt;answer&gt;&lt;guid&gt;2DA176845E3F408785B21B779CC87632&lt;/guid&gt;&lt;answertext&gt;Testosterone&lt;/answertext&gt;&lt;valuetype&gt;-1&lt;/valuetype&gt;&lt;/answer&gt;&lt;answer&gt;&lt;guid&gt;97D6A21FE6CD4387BF7EE28CA17C7EF7&lt;/guid&gt;&lt;answertext&gt;Epinephrine&lt;/answertext&gt;&lt;valuetype&gt;-1&lt;/valuetype&gt;&lt;/answer&gt;&lt;/answers&gt;&lt;/multichoice&gt;&lt;/questions&gt;&lt;/questionlist&gt;"/>
-  <p:tag name="LIVECHARTING" val="False"/>
-  <p:tag name="CHARTTYPE" val="0"/>
-  <p:tag name="CHARTDEFINEDCOLORS" val="3,6,10,45,32,50,13,4,9,55,1"/>
-</p:tagLst>
-</file>
-
-<file path=ppt/tags/tag7.xml><?xml version="1.0" encoding="utf-8"?>
-<p:tagLst xmlns:a="http://schemas.openxmlformats.org/drawingml/2006/main" xmlns:r="http://schemas.openxmlformats.org/officeDocument/2006/relationships" xmlns:p="http://schemas.openxmlformats.org/presentationml/2006/main">
-  <p:tag name="ZEROBASED" val="False"/>
-</p:tagLst>
-</file>
-
-<file path=ppt/tags/tag8.xml><?xml version="1.0" encoding="utf-8"?>
-<p:tagLst xmlns:a="http://schemas.openxmlformats.org/drawingml/2006/main" xmlns:r="http://schemas.openxmlformats.org/officeDocument/2006/relationships" xmlns:p="http://schemas.openxmlformats.org/presentationml/2006/main">
-  <p:tag name="TYPE" val="0"/>
-  <p:tag name="DEFINEDCOLORS" val="3,6,10,45,32,50,13,4,9,55,1"/>
-  <p:tag name="COLORTYPE" val="SCHEME"/>
-  <p:tag name="NUMBERFORMAT" val="0"/>
-  <p:tag name="LABELFORMAT" val="0"/>
-</p:tagLst>
-</file>
-
-<file path=ppt/tags/tag9.xml><?xml version="1.0" encoding="utf-8"?>
 <p:tagLst xmlns:a="http://schemas.openxmlformats.org/drawingml/2006/main" xmlns:r="http://schemas.openxmlformats.org/officeDocument/2006/relationships" xmlns:p="http://schemas.openxmlformats.org/presentationml/2006/main">
   <p:tag name="TPCOUNTDOWNSECONDS" val="30"/>
   <p:tag name="TYPE" val="0"/>

</xml_diff>